<commit_message>
Added the final report slides
</commit_message>
<xml_diff>
--- a/Reports/Team 8B - CS 370 Fall 2024 Term Project.pptx
+++ b/Reports/Team 8B - CS 370 Fall 2024 Term Project.pptx
@@ -8,10 +8,12 @@
     <p:sldId id="256" r:id="rId2"/>
     <p:sldId id="257" r:id="rId3"/>
     <p:sldId id="258" r:id="rId4"/>
-    <p:sldId id="259" r:id="rId5"/>
-    <p:sldId id="260" r:id="rId6"/>
-    <p:sldId id="261" r:id="rId7"/>
-    <p:sldId id="262" r:id="rId8"/>
+    <p:sldId id="260" r:id="rId5"/>
+    <p:sldId id="259" r:id="rId6"/>
+    <p:sldId id="263" r:id="rId7"/>
+    <p:sldId id="264" r:id="rId8"/>
+    <p:sldId id="261" r:id="rId9"/>
+    <p:sldId id="262" r:id="rId10"/>
   </p:sldIdLst>
   <p:sldSz cx="12192000" cy="6858000"/>
   <p:notesSz cx="6858000" cy="9144000"/>
@@ -110,6 +112,11 @@
       </a:defRPr>
     </a:lvl9pPr>
   </p:defaultTextStyle>
+  <p:extLst>
+    <p:ext uri="{EFAFB233-063F-42B5-8137-9DF3F51BA10A}">
+      <p15:sldGuideLst xmlns:p15="http://schemas.microsoft.com/office/powerpoint/2012/main"/>
+    </p:ext>
+  </p:extLst>
 </p:presentation>
 </file>
 
@@ -615,7 +622,7 @@
           <a:p>
             <a:fld id="{2D2BB97C-7247-4465-A104-EBC781AC01DB}" type="datetimeFigureOut">
               <a:rPr lang="en-US" smtClean="0"/>
-              <a:t>11/20/2024</a:t>
+              <a:t>12/2/2024</a:t>
             </a:fld>
             <a:endParaRPr lang="en-US"/>
           </a:p>
@@ -911,7 +918,7 @@
           <a:p>
             <a:fld id="{2D2BB97C-7247-4465-A104-EBC781AC01DB}" type="datetimeFigureOut">
               <a:rPr lang="en-US" smtClean="0"/>
-              <a:t>11/20/2024</a:t>
+              <a:t>12/2/2024</a:t>
             </a:fld>
             <a:endParaRPr lang="en-US"/>
           </a:p>
@@ -1159,7 +1166,7 @@
           <a:p>
             <a:fld id="{2D2BB97C-7247-4465-A104-EBC781AC01DB}" type="datetimeFigureOut">
               <a:rPr lang="en-US" smtClean="0"/>
-              <a:t>11/20/2024</a:t>
+              <a:t>12/2/2024</a:t>
             </a:fld>
             <a:endParaRPr lang="en-US"/>
           </a:p>
@@ -1699,7 +1706,7 @@
           <a:p>
             <a:fld id="{2D2BB97C-7247-4465-A104-EBC781AC01DB}" type="datetimeFigureOut">
               <a:rPr lang="en-US" smtClean="0"/>
-              <a:t>11/20/2024</a:t>
+              <a:t>12/2/2024</a:t>
             </a:fld>
             <a:endParaRPr lang="en-US"/>
           </a:p>
@@ -1947,7 +1954,7 @@
           <a:p>
             <a:fld id="{2D2BB97C-7247-4465-A104-EBC781AC01DB}" type="datetimeFigureOut">
               <a:rPr lang="en-US" smtClean="0"/>
-              <a:t>11/20/2024</a:t>
+              <a:t>12/2/2024</a:t>
             </a:fld>
             <a:endParaRPr lang="en-US"/>
           </a:p>
@@ -2479,7 +2486,7 @@
           <a:p>
             <a:fld id="{2D2BB97C-7247-4465-A104-EBC781AC01DB}" type="datetimeFigureOut">
               <a:rPr lang="en-US" smtClean="0"/>
-              <a:t>11/20/2024</a:t>
+              <a:t>12/2/2024</a:t>
             </a:fld>
             <a:endParaRPr lang="en-US"/>
           </a:p>
@@ -2776,7 +2783,7 @@
           <a:p>
             <a:fld id="{2D2BB97C-7247-4465-A104-EBC781AC01DB}" type="datetimeFigureOut">
               <a:rPr lang="en-US" smtClean="0"/>
-              <a:t>11/20/2024</a:t>
+              <a:t>12/2/2024</a:t>
             </a:fld>
             <a:endParaRPr lang="en-US"/>
           </a:p>
@@ -2950,7 +2957,7 @@
           <a:p>
             <a:fld id="{2D2BB97C-7247-4465-A104-EBC781AC01DB}" type="datetimeFigureOut">
               <a:rPr lang="en-US" smtClean="0"/>
-              <a:t>11/20/2024</a:t>
+              <a:t>12/2/2024</a:t>
             </a:fld>
             <a:endParaRPr lang="en-US"/>
           </a:p>
@@ -3130,7 +3137,7 @@
           <a:p>
             <a:fld id="{2D2BB97C-7247-4465-A104-EBC781AC01DB}" type="datetimeFigureOut">
               <a:rPr lang="en-US" smtClean="0"/>
-              <a:t>11/20/2024</a:t>
+              <a:t>12/2/2024</a:t>
             </a:fld>
             <a:endParaRPr lang="en-US"/>
           </a:p>
@@ -3300,7 +3307,7 @@
           <a:p>
             <a:fld id="{2D2BB97C-7247-4465-A104-EBC781AC01DB}" type="datetimeFigureOut">
               <a:rPr lang="en-US" smtClean="0"/>
-              <a:t>11/20/2024</a:t>
+              <a:t>12/2/2024</a:t>
             </a:fld>
             <a:endParaRPr lang="en-US"/>
           </a:p>
@@ -3551,7 +3558,7 @@
           <a:p>
             <a:fld id="{2D2BB97C-7247-4465-A104-EBC781AC01DB}" type="datetimeFigureOut">
               <a:rPr lang="en-US" smtClean="0"/>
-              <a:t>11/20/2024</a:t>
+              <a:t>12/2/2024</a:t>
             </a:fld>
             <a:endParaRPr lang="en-US"/>
           </a:p>
@@ -3848,7 +3855,7 @@
           <a:p>
             <a:fld id="{2D2BB97C-7247-4465-A104-EBC781AC01DB}" type="datetimeFigureOut">
               <a:rPr lang="en-US" smtClean="0"/>
-              <a:t>11/20/2024</a:t>
+              <a:t>12/2/2024</a:t>
             </a:fld>
             <a:endParaRPr lang="en-US"/>
           </a:p>
@@ -4290,7 +4297,7 @@
           <a:p>
             <a:fld id="{2D2BB97C-7247-4465-A104-EBC781AC01DB}" type="datetimeFigureOut">
               <a:rPr lang="en-US" smtClean="0"/>
-              <a:t>11/20/2024</a:t>
+              <a:t>12/2/2024</a:t>
             </a:fld>
             <a:endParaRPr lang="en-US"/>
           </a:p>
@@ -4408,7 +4415,7 @@
           <a:p>
             <a:fld id="{2D2BB97C-7247-4465-A104-EBC781AC01DB}" type="datetimeFigureOut">
               <a:rPr lang="en-US" smtClean="0"/>
-              <a:t>11/20/2024</a:t>
+              <a:t>12/2/2024</a:t>
             </a:fld>
             <a:endParaRPr lang="en-US"/>
           </a:p>
@@ -4503,7 +4510,7 @@
           <a:p>
             <a:fld id="{2D2BB97C-7247-4465-A104-EBC781AC01DB}" type="datetimeFigureOut">
               <a:rPr lang="en-US" smtClean="0"/>
-              <a:t>11/20/2024</a:t>
+              <a:t>12/2/2024</a:t>
             </a:fld>
             <a:endParaRPr lang="en-US"/>
           </a:p>
@@ -4786,7 +4793,7 @@
           <a:p>
             <a:fld id="{2D2BB97C-7247-4465-A104-EBC781AC01DB}" type="datetimeFigureOut">
               <a:rPr lang="en-US" smtClean="0"/>
-              <a:t>11/20/2024</a:t>
+              <a:t>12/2/2024</a:t>
             </a:fld>
             <a:endParaRPr lang="en-US"/>
           </a:p>
@@ -5077,7 +5084,7 @@
           <a:p>
             <a:fld id="{2D2BB97C-7247-4465-A104-EBC781AC01DB}" type="datetimeFigureOut">
               <a:rPr lang="en-US" smtClean="0"/>
-              <a:t>11/20/2024</a:t>
+              <a:t>12/2/2024</a:t>
             </a:fld>
             <a:endParaRPr lang="en-US"/>
           </a:p>
@@ -5607,7 +5614,7 @@
           <a:p>
             <a:fld id="{2D2BB97C-7247-4465-A104-EBC781AC01DB}" type="datetimeFigureOut">
               <a:rPr lang="en-US" smtClean="0"/>
-              <a:t>11/20/2024</a:t>
+              <a:t>12/2/2024</a:t>
             </a:fld>
             <a:endParaRPr lang="en-US"/>
           </a:p>
@@ -6198,6 +6205,17 @@
               <a:t>Raspberry Pi and BME688 Sensor</a:t>
             </a:r>
           </a:p>
+          <a:p>
+            <a:r>
+              <a:rPr lang="en-US" dirty="0"/>
+              <a:t>John Maksuta, Ali Fayad, Matthew </a:t>
+            </a:r>
+            <a:r>
+              <a:rPr lang="en-US" dirty="0" err="1"/>
+              <a:t>Boin</a:t>
+            </a:r>
+            <a:endParaRPr lang="en-US" dirty="0"/>
+          </a:p>
         </p:txBody>
       </p:sp>
     </p:spTree>
@@ -6378,12 +6396,67 @@
             <p:ph idx="1"/>
           </p:nvPr>
         </p:nvSpPr>
-        <p:spPr/>
-        <p:txBody>
-          <a:bodyPr/>
+        <p:spPr>
+          <a:xfrm>
+            <a:off x="1484310" y="2666999"/>
+            <a:ext cx="10018713" cy="3505201"/>
+          </a:xfrm>
+        </p:spPr>
+        <p:txBody>
+          <a:bodyPr>
+            <a:normAutofit/>
+          </a:bodyPr>
           <a:lstStyle/>
           <a:p>
-            <a:endParaRPr lang="en-US"/>
+            <a:r>
+              <a:rPr lang="en-US" dirty="0"/>
+              <a:t>A Remote Sensor for Monitoring Environment</a:t>
+            </a:r>
+          </a:p>
+          <a:p>
+            <a:pPr lvl="1"/>
+            <a:r>
+              <a:rPr lang="en-US" dirty="0"/>
+              <a:t>Environmental monitoring data is necessary for scientific study</a:t>
+            </a:r>
+          </a:p>
+          <a:p>
+            <a:pPr lvl="1"/>
+            <a:r>
+              <a:rPr lang="en-US" dirty="0"/>
+              <a:t>Funding can be scarce and leads to uncovered areas of the map</a:t>
+            </a:r>
+          </a:p>
+          <a:p>
+            <a:pPr lvl="1"/>
+            <a:r>
+              <a:rPr lang="en-US" dirty="0"/>
+              <a:t>There is a need for cheap remote monitoring equipment</a:t>
+            </a:r>
+          </a:p>
+          <a:p>
+            <a:r>
+              <a:rPr lang="en-US" dirty="0"/>
+              <a:t>Communicate with single-board computer device</a:t>
+            </a:r>
+          </a:p>
+          <a:p>
+            <a:pPr lvl="1"/>
+            <a:r>
+              <a:rPr lang="en-US" dirty="0"/>
+              <a:t>Communication from remote host to device</a:t>
+            </a:r>
+          </a:p>
+          <a:p>
+            <a:pPr lvl="1"/>
+            <a:r>
+              <a:rPr lang="en-US" dirty="0"/>
+              <a:t>Communication from device to sensor board</a:t>
+            </a:r>
+          </a:p>
+          <a:p>
+            <a:pPr lvl="1"/>
+            <a:endParaRPr lang="en-US" dirty="0"/>
           </a:p>
         </p:txBody>
       </p:sp>
@@ -6422,7 +6495,7 @@
           <p:cNvPr id="2" name="Title 1">
             <a:extLst>
               <a:ext uri="{FF2B5EF4-FFF2-40B4-BE49-F238E27FC236}">
-                <a16:creationId xmlns:a16="http://schemas.microsoft.com/office/drawing/2014/main" id="{80DE9297-AC36-9DD5-EF9B-E09F63CDC218}"/>
+                <a16:creationId xmlns:a16="http://schemas.microsoft.com/office/drawing/2014/main" id="{31755FCC-0600-C33E-8333-13D62FEE1411}"/>
               </a:ext>
             </a:extLst>
           </p:cNvPr>
@@ -6440,7 +6513,7 @@
           <a:p>
             <a:r>
               <a:rPr lang="en-US" dirty="0"/>
-              <a:t>Methodology</a:t>
+              <a:t>Proposed Solution and Implementation Strategy</a:t>
             </a:r>
           </a:p>
         </p:txBody>
@@ -6450,7 +6523,7 @@
           <p:cNvPr id="3" name="Content Placeholder 2">
             <a:extLst>
               <a:ext uri="{FF2B5EF4-FFF2-40B4-BE49-F238E27FC236}">
-                <a16:creationId xmlns:a16="http://schemas.microsoft.com/office/drawing/2014/main" id="{61101F47-7951-BD0D-E2FB-BF3DE2CF1F31}"/>
+                <a16:creationId xmlns:a16="http://schemas.microsoft.com/office/drawing/2014/main" id="{33C9C35F-DACB-2626-8D49-E85DD63881FE}"/>
               </a:ext>
             </a:extLst>
           </p:cNvPr>
@@ -6466,14 +6539,41 @@
           <a:bodyPr/>
           <a:lstStyle/>
           <a:p>
-            <a:endParaRPr lang="en-US"/>
+            <a:r>
+              <a:rPr lang="en-US" dirty="0"/>
+              <a:t>Develop a web-based application running on Raspberry Pi Board</a:t>
+            </a:r>
+          </a:p>
+          <a:p>
+            <a:r>
+              <a:rPr lang="en-US" dirty="0"/>
+              <a:t>User can connect to the Pi over a web browser, and control the Pi Board</a:t>
+            </a:r>
+          </a:p>
+          <a:p>
+            <a:r>
+              <a:rPr lang="en-US" dirty="0"/>
+              <a:t>Client-side communicates with Server-side and receives data</a:t>
+            </a:r>
+          </a:p>
+          <a:p>
+            <a:r>
+              <a:rPr lang="en-US" dirty="0"/>
+              <a:t>Server-side communicates with the Sensor and obtains readings</a:t>
+            </a:r>
+          </a:p>
+          <a:p>
+            <a:r>
+              <a:rPr lang="en-US" dirty="0"/>
+              <a:t>Sensor communication is through the JAR interface for portability</a:t>
+            </a:r>
           </a:p>
         </p:txBody>
       </p:sp>
     </p:spTree>
     <p:extLst>
       <p:ext uri="{BB962C8B-B14F-4D97-AF65-F5344CB8AC3E}">
-        <p14:creationId xmlns:p14="http://schemas.microsoft.com/office/powerpoint/2010/main" val="1809823319"/>
+        <p14:creationId xmlns:p14="http://schemas.microsoft.com/office/powerpoint/2010/main" val="1187471666"/>
       </p:ext>
     </p:extLst>
   </p:cSld>
@@ -6505,7 +6605,7 @@
           <p:cNvPr id="2" name="Title 1">
             <a:extLst>
               <a:ext uri="{FF2B5EF4-FFF2-40B4-BE49-F238E27FC236}">
-                <a16:creationId xmlns:a16="http://schemas.microsoft.com/office/drawing/2014/main" id="{31755FCC-0600-C33E-8333-13D62FEE1411}"/>
+                <a16:creationId xmlns:a16="http://schemas.microsoft.com/office/drawing/2014/main" id="{80DE9297-AC36-9DD5-EF9B-E09F63CDC218}"/>
               </a:ext>
             </a:extLst>
           </p:cNvPr>
@@ -6523,7 +6623,7 @@
           <a:p>
             <a:r>
               <a:rPr lang="en-US" dirty="0"/>
-              <a:t>Proposed Solution and Implementation Strategy</a:t>
+              <a:t>Methodology</a:t>
             </a:r>
           </a:p>
         </p:txBody>
@@ -6533,7 +6633,7 @@
           <p:cNvPr id="3" name="Content Placeholder 2">
             <a:extLst>
               <a:ext uri="{FF2B5EF4-FFF2-40B4-BE49-F238E27FC236}">
-                <a16:creationId xmlns:a16="http://schemas.microsoft.com/office/drawing/2014/main" id="{33C9C35F-DACB-2626-8D49-E85DD63881FE}"/>
+                <a16:creationId xmlns:a16="http://schemas.microsoft.com/office/drawing/2014/main" id="{61101F47-7951-BD0D-E2FB-BF3DE2CF1F31}"/>
               </a:ext>
             </a:extLst>
           </p:cNvPr>
@@ -6549,14 +6649,29 @@
           <a:bodyPr/>
           <a:lstStyle/>
           <a:p>
-            <a:endParaRPr lang="en-US"/>
+            <a:r>
+              <a:rPr lang="en-US" dirty="0"/>
+              <a:t>Team operates individually, fully remote</a:t>
+            </a:r>
+          </a:p>
+          <a:p>
+            <a:r>
+              <a:rPr lang="en-US" dirty="0"/>
+              <a:t>Each member obtained the same primary equipment: single-board computer and sensor</a:t>
+            </a:r>
+          </a:p>
+          <a:p>
+            <a:r>
+              <a:rPr lang="en-US" dirty="0"/>
+              <a:t>Raspberry Pi 3 B+ and Adafruit BME688 sensor board</a:t>
+            </a:r>
           </a:p>
         </p:txBody>
       </p:sp>
     </p:spTree>
     <p:extLst>
       <p:ext uri="{BB962C8B-B14F-4D97-AF65-F5344CB8AC3E}">
-        <p14:creationId xmlns:p14="http://schemas.microsoft.com/office/powerpoint/2010/main" val="1187471666"/>
+        <p14:creationId xmlns:p14="http://schemas.microsoft.com/office/powerpoint/2010/main" val="1809823319"/>
       </p:ext>
     </p:extLst>
   </p:cSld>
@@ -6567,6 +6682,310 @@
 </file>
 
 <file path=ppt/slides/slide6.xml><?xml version="1.0" encoding="utf-8"?>
+<p:sld xmlns:a="http://schemas.openxmlformats.org/drawingml/2006/main" xmlns:r="http://schemas.openxmlformats.org/officeDocument/2006/relationships" xmlns:p="http://schemas.openxmlformats.org/presentationml/2006/main">
+  <p:cSld>
+    <p:spTree>
+      <p:nvGrpSpPr>
+        <p:cNvPr id="1" name="">
+          <a:extLst>
+            <a:ext uri="{FF2B5EF4-FFF2-40B4-BE49-F238E27FC236}">
+              <a16:creationId xmlns:a16="http://schemas.microsoft.com/office/drawing/2014/main" id="{BC60D762-E0D2-C6F2-1248-A6479F49F241}"/>
+            </a:ext>
+          </a:extLst>
+        </p:cNvPr>
+        <p:cNvGrpSpPr/>
+        <p:nvPr/>
+      </p:nvGrpSpPr>
+      <p:grpSpPr>
+        <a:xfrm>
+          <a:off x="0" y="0"/>
+          <a:ext cx="0" cy="0"/>
+          <a:chOff x="0" y="0"/>
+          <a:chExt cx="0" cy="0"/>
+        </a:xfrm>
+      </p:grpSpPr>
+      <p:sp>
+        <p:nvSpPr>
+          <p:cNvPr id="2" name="Title 1">
+            <a:extLst>
+              <a:ext uri="{FF2B5EF4-FFF2-40B4-BE49-F238E27FC236}">
+                <a16:creationId xmlns:a16="http://schemas.microsoft.com/office/drawing/2014/main" id="{5636C073-3CB5-F16A-B486-5702AAF01FB7}"/>
+              </a:ext>
+            </a:extLst>
+          </p:cNvPr>
+          <p:cNvSpPr>
+            <a:spLocks noGrp="1"/>
+          </p:cNvSpPr>
+          <p:nvPr>
+            <p:ph type="title"/>
+          </p:nvPr>
+        </p:nvSpPr>
+        <p:spPr>
+          <a:xfrm>
+            <a:off x="1484311" y="1120511"/>
+            <a:ext cx="10018713" cy="1487776"/>
+          </a:xfrm>
+        </p:spPr>
+        <p:txBody>
+          <a:bodyPr/>
+          <a:lstStyle/>
+          <a:p>
+            <a:r>
+              <a:rPr lang="en-US" dirty="0"/>
+              <a:t>Methodology</a:t>
+            </a:r>
+            <a:br>
+              <a:rPr lang="en-US" dirty="0"/>
+            </a:br>
+            <a:r>
+              <a:rPr lang="en-US" dirty="0"/>
+              <a:t>Software Environment</a:t>
+            </a:r>
+          </a:p>
+        </p:txBody>
+      </p:sp>
+      <p:sp>
+        <p:nvSpPr>
+          <p:cNvPr id="3" name="Content Placeholder 2">
+            <a:extLst>
+              <a:ext uri="{FF2B5EF4-FFF2-40B4-BE49-F238E27FC236}">
+                <a16:creationId xmlns:a16="http://schemas.microsoft.com/office/drawing/2014/main" id="{2EC188AB-21BE-FDFD-B176-64EE2C787E63}"/>
+              </a:ext>
+            </a:extLst>
+          </p:cNvPr>
+          <p:cNvSpPr>
+            <a:spLocks noGrp="1"/>
+          </p:cNvSpPr>
+          <p:nvPr>
+            <p:ph idx="1"/>
+          </p:nvPr>
+        </p:nvSpPr>
+        <p:spPr/>
+        <p:txBody>
+          <a:bodyPr/>
+          <a:lstStyle/>
+          <a:p>
+            <a:r>
+              <a:rPr lang="en-US" dirty="0"/>
+              <a:t>VS Code</a:t>
+            </a:r>
+          </a:p>
+          <a:p>
+            <a:r>
+              <a:rPr lang="en-US" dirty="0" err="1"/>
+              <a:t>Github</a:t>
+            </a:r>
+            <a:r>
+              <a:rPr lang="en-US" dirty="0"/>
+              <a:t> Repository</a:t>
+            </a:r>
+          </a:p>
+          <a:p>
+            <a:r>
+              <a:rPr lang="en-US" dirty="0"/>
+              <a:t>Maven, NodeJS</a:t>
+            </a:r>
+          </a:p>
+        </p:txBody>
+      </p:sp>
+    </p:spTree>
+    <p:extLst>
+      <p:ext uri="{BB962C8B-B14F-4D97-AF65-F5344CB8AC3E}">
+        <p14:creationId xmlns:p14="http://schemas.microsoft.com/office/powerpoint/2010/main" val="412434086"/>
+      </p:ext>
+    </p:extLst>
+  </p:cSld>
+  <p:clrMapOvr>
+    <a:masterClrMapping/>
+  </p:clrMapOvr>
+</p:sld>
+</file>
+
+<file path=ppt/slides/slide7.xml><?xml version="1.0" encoding="utf-8"?>
+<p:sld xmlns:a="http://schemas.openxmlformats.org/drawingml/2006/main" xmlns:r="http://schemas.openxmlformats.org/officeDocument/2006/relationships" xmlns:p="http://schemas.openxmlformats.org/presentationml/2006/main">
+  <p:cSld>
+    <p:spTree>
+      <p:nvGrpSpPr>
+        <p:cNvPr id="1" name="">
+          <a:extLst>
+            <a:ext uri="{FF2B5EF4-FFF2-40B4-BE49-F238E27FC236}">
+              <a16:creationId xmlns:a16="http://schemas.microsoft.com/office/drawing/2014/main" id="{438EB3EB-66B2-3CC8-F3E0-EEEFBE2598D7}"/>
+            </a:ext>
+          </a:extLst>
+        </p:cNvPr>
+        <p:cNvGrpSpPr/>
+        <p:nvPr/>
+      </p:nvGrpSpPr>
+      <p:grpSpPr>
+        <a:xfrm>
+          <a:off x="0" y="0"/>
+          <a:ext cx="0" cy="0"/>
+          <a:chOff x="0" y="0"/>
+          <a:chExt cx="0" cy="0"/>
+        </a:xfrm>
+      </p:grpSpPr>
+      <p:sp>
+        <p:nvSpPr>
+          <p:cNvPr id="2" name="Title 1">
+            <a:extLst>
+              <a:ext uri="{FF2B5EF4-FFF2-40B4-BE49-F238E27FC236}">
+                <a16:creationId xmlns:a16="http://schemas.microsoft.com/office/drawing/2014/main" id="{CBEA55DF-7496-59AA-ACF8-145ECB94EA8F}"/>
+              </a:ext>
+            </a:extLst>
+          </p:cNvPr>
+          <p:cNvSpPr>
+            <a:spLocks noGrp="1"/>
+          </p:cNvSpPr>
+          <p:nvPr>
+            <p:ph type="title"/>
+          </p:nvPr>
+        </p:nvSpPr>
+        <p:spPr>
+          <a:xfrm>
+            <a:off x="1484311" y="1120511"/>
+            <a:ext cx="10018713" cy="1487776"/>
+          </a:xfrm>
+        </p:spPr>
+        <p:txBody>
+          <a:bodyPr/>
+          <a:lstStyle/>
+          <a:p>
+            <a:r>
+              <a:rPr lang="en-US" dirty="0"/>
+              <a:t>Methodology</a:t>
+            </a:r>
+            <a:br>
+              <a:rPr lang="en-US" dirty="0"/>
+            </a:br>
+            <a:r>
+              <a:rPr lang="en-US" dirty="0"/>
+              <a:t>Project Design</a:t>
+            </a:r>
+          </a:p>
+        </p:txBody>
+      </p:sp>
+      <p:sp>
+        <p:nvSpPr>
+          <p:cNvPr id="3" name="Content Placeholder 2">
+            <a:extLst>
+              <a:ext uri="{FF2B5EF4-FFF2-40B4-BE49-F238E27FC236}">
+                <a16:creationId xmlns:a16="http://schemas.microsoft.com/office/drawing/2014/main" id="{4E17F8CD-F6D5-696D-E4FD-647B3039523A}"/>
+              </a:ext>
+            </a:extLst>
+          </p:cNvPr>
+          <p:cNvSpPr>
+            <a:spLocks noGrp="1"/>
+          </p:cNvSpPr>
+          <p:nvPr>
+            <p:ph idx="1"/>
+          </p:nvPr>
+        </p:nvSpPr>
+        <p:spPr/>
+        <p:txBody>
+          <a:bodyPr>
+            <a:normAutofit fontScale="92500" lnSpcReduction="20000"/>
+          </a:bodyPr>
+          <a:lstStyle/>
+          <a:p>
+            <a:r>
+              <a:rPr lang="en-US" dirty="0"/>
+              <a:t>Client Application</a:t>
+            </a:r>
+          </a:p>
+          <a:p>
+            <a:pPr lvl="1"/>
+            <a:r>
+              <a:rPr lang="en-US" dirty="0"/>
+              <a:t>weather-client – (</a:t>
+            </a:r>
+            <a:r>
+              <a:rPr lang="en-US" dirty="0" err="1"/>
+              <a:t>Javascript</a:t>
+            </a:r>
+            <a:r>
+              <a:rPr lang="en-US" dirty="0"/>
+              <a:t>, </a:t>
+            </a:r>
+            <a:r>
+              <a:rPr lang="en-US" dirty="0" err="1"/>
+              <a:t>ReactApp</a:t>
+            </a:r>
+            <a:r>
+              <a:rPr lang="en-US" dirty="0"/>
+              <a:t>, NodeJS)</a:t>
+            </a:r>
+          </a:p>
+          <a:p>
+            <a:r>
+              <a:rPr lang="en-US" dirty="0"/>
+              <a:t>Server Application</a:t>
+            </a:r>
+          </a:p>
+          <a:p>
+            <a:pPr lvl="1"/>
+            <a:r>
+              <a:rPr lang="en-US" dirty="0"/>
+              <a:t>weather – (Java, </a:t>
+            </a:r>
+            <a:r>
+              <a:rPr lang="en-US" dirty="0" err="1"/>
+              <a:t>Springboot</a:t>
+            </a:r>
+            <a:r>
+              <a:rPr lang="en-US" dirty="0"/>
+              <a:t>, Maven)</a:t>
+            </a:r>
+          </a:p>
+          <a:p>
+            <a:r>
+              <a:rPr lang="en-US" dirty="0"/>
+              <a:t>External Jar file for Sensor Interface</a:t>
+            </a:r>
+          </a:p>
+          <a:p>
+            <a:pPr lvl="1"/>
+            <a:r>
+              <a:rPr lang="en-US" dirty="0"/>
+              <a:t>adafruit_bme680 – (Java, Maven)</a:t>
+            </a:r>
+          </a:p>
+          <a:p>
+            <a:r>
+              <a:rPr lang="en-US" dirty="0"/>
+              <a:t>Database service</a:t>
+            </a:r>
+          </a:p>
+          <a:p>
+            <a:pPr lvl="1"/>
+            <a:r>
+              <a:rPr lang="en-US" dirty="0"/>
+              <a:t>sensor2db.py – (Python, </a:t>
+            </a:r>
+            <a:r>
+              <a:rPr lang="en-US" dirty="0" err="1"/>
+              <a:t>systemd</a:t>
+            </a:r>
+            <a:r>
+              <a:rPr lang="en-US" dirty="0"/>
+              <a:t>)</a:t>
+            </a:r>
+          </a:p>
+        </p:txBody>
+      </p:sp>
+    </p:spTree>
+    <p:extLst>
+      <p:ext uri="{BB962C8B-B14F-4D97-AF65-F5344CB8AC3E}">
+        <p14:creationId xmlns:p14="http://schemas.microsoft.com/office/powerpoint/2010/main" val="41011405"/>
+      </p:ext>
+    </p:extLst>
+  </p:cSld>
+  <p:clrMapOvr>
+    <a:masterClrMapping/>
+  </p:clrMapOvr>
+</p:sld>
+</file>
+
+<file path=ppt/slides/slide8.xml><?xml version="1.0" encoding="utf-8"?>
 <p:sld xmlns:a="http://schemas.openxmlformats.org/drawingml/2006/main" xmlns:r="http://schemas.openxmlformats.org/officeDocument/2006/relationships" xmlns:p="http://schemas.openxmlformats.org/presentationml/2006/main">
   <p:cSld>
     <p:spTree>
@@ -6611,31 +7030,135 @@
           </a:p>
         </p:txBody>
       </p:sp>
-      <p:sp>
-        <p:nvSpPr>
-          <p:cNvPr id="3" name="Content Placeholder 2">
-            <a:extLst>
-              <a:ext uri="{FF2B5EF4-FFF2-40B4-BE49-F238E27FC236}">
-                <a16:creationId xmlns:a16="http://schemas.microsoft.com/office/drawing/2014/main" id="{A57D1F36-3CFA-DC65-B8F6-9E17BF8B6531}"/>
-              </a:ext>
-            </a:extLst>
-          </p:cNvPr>
-          <p:cNvSpPr>
-            <a:spLocks noGrp="1"/>
-          </p:cNvSpPr>
-          <p:nvPr>
-            <p:ph idx="1"/>
-          </p:nvPr>
-        </p:nvSpPr>
-        <p:spPr/>
-        <p:txBody>
-          <a:bodyPr/>
-          <a:lstStyle/>
-          <a:p>
-            <a:endParaRPr lang="en-US"/>
-          </a:p>
-        </p:txBody>
-      </p:sp>
+      <mc:AlternateContent xmlns:mc="http://schemas.openxmlformats.org/markup-compatibility/2006">
+        <mc:Choice xmlns:a14="http://schemas.microsoft.com/office/drawing/2010/main" Requires="a14">
+          <p:sp>
+            <p:nvSpPr>
+              <p:cNvPr id="3" name="Content Placeholder 2">
+                <a:extLst>
+                  <a:ext uri="{FF2B5EF4-FFF2-40B4-BE49-F238E27FC236}">
+                    <a16:creationId xmlns:a16="http://schemas.microsoft.com/office/drawing/2014/main" id="{A57D1F36-3CFA-DC65-B8F6-9E17BF8B6531}"/>
+                  </a:ext>
+                </a:extLst>
+              </p:cNvPr>
+              <p:cNvSpPr>
+                <a:spLocks noGrp="1"/>
+              </p:cNvSpPr>
+              <p:nvPr>
+                <p:ph idx="1"/>
+              </p:nvPr>
+            </p:nvSpPr>
+            <p:spPr/>
+            <p:txBody>
+              <a:bodyPr/>
+              <a:lstStyle/>
+              <a:p>
+                <a:r>
+                  <a:rPr lang="en-US" dirty="0"/>
+                  <a:t>Successfully communicate with device and displays live readings</a:t>
+                </a:r>
+              </a:p>
+              <a:p>
+                <a:r>
+                  <a:rPr lang="en-US" dirty="0"/>
+                  <a:t>Power consumption </a:t>
+                </a:r>
+                <a14:m>
+                  <m:oMath xmlns:m="http://schemas.openxmlformats.org/officeDocument/2006/math">
+                    <m:r>
+                      <a:rPr lang="x-none" sz="1800" i="1" spc="-5" smtClean="0">
+                        <a:effectLst/>
+                        <a:latin typeface="Cambria Math" panose="02040503050406030204" pitchFamily="18" charset="0"/>
+                        <a:ea typeface="Cambria Math" panose="02040503050406030204" pitchFamily="18" charset="0"/>
+                        <a:cs typeface="Times New Roman" panose="02020603050405020304" pitchFamily="18" charset="0"/>
+                      </a:rPr>
+                      <m:t>≈</m:t>
+                    </m:r>
+                    <m:r>
+                      <a:rPr lang="x-none" sz="1800" i="1" spc="-5" smtClean="0">
+                        <a:effectLst/>
+                        <a:latin typeface="Cambria Math" panose="02040503050406030204" pitchFamily="18" charset="0"/>
+                        <a:ea typeface="SimSun" panose="02010600030101010101" pitchFamily="2" charset="-122"/>
+                        <a:cs typeface="Times New Roman" panose="02020603050405020304" pitchFamily="18" charset="0"/>
+                      </a:rPr>
+                      <m:t>530</m:t>
+                    </m:r>
+                    <m:r>
+                      <a:rPr lang="x-none" sz="1800" i="1" spc="-5" smtClean="0">
+                        <a:effectLst/>
+                        <a:latin typeface="Cambria Math" panose="02040503050406030204" pitchFamily="18" charset="0"/>
+                        <a:ea typeface="SimSun" panose="02010600030101010101" pitchFamily="2" charset="-122"/>
+                        <a:cs typeface="Times New Roman" panose="02020603050405020304" pitchFamily="18" charset="0"/>
+                      </a:rPr>
+                      <m:t>𝑚𝐴</m:t>
+                    </m:r>
+                  </m:oMath>
+                </a14:m>
+                <a:endParaRPr lang="en-US" dirty="0"/>
+              </a:p>
+              <a:p>
+                <a:r>
+                  <a:rPr lang="en-US" dirty="0"/>
+                  <a:t>Total cost for Hardware components </a:t>
+                </a:r>
+                <a:r>
+                  <a:rPr lang="en-US" sz="1800" dirty="0">
+                    <a:effectLst/>
+                    <a:latin typeface="Times New Roman" panose="02020603050405020304" pitchFamily="18" charset="0"/>
+                    <a:ea typeface="SimSun" panose="02010600030101010101" pitchFamily="2" charset="-122"/>
+                  </a:rPr>
+                  <a:t>$54.95 retail</a:t>
+                </a:r>
+              </a:p>
+              <a:p>
+                <a:r>
+                  <a:rPr lang="en-US" dirty="0"/>
+                  <a:t>Modular design allows for portability and improvement</a:t>
+                </a:r>
+              </a:p>
+            </p:txBody>
+          </p:sp>
+        </mc:Choice>
+        <mc:Fallback>
+          <p:sp>
+            <p:nvSpPr>
+              <p:cNvPr id="3" name="Content Placeholder 2">
+                <a:extLst>
+                  <a:ext uri="{FF2B5EF4-FFF2-40B4-BE49-F238E27FC236}">
+                    <a16:creationId xmlns:a16="http://schemas.microsoft.com/office/drawing/2014/main" id="{A57D1F36-3CFA-DC65-B8F6-9E17BF8B6531}"/>
+                  </a:ext>
+                </a:extLst>
+              </p:cNvPr>
+              <p:cNvSpPr>
+                <a:spLocks noGrp="1" noRot="1" noChangeAspect="1" noMove="1" noResize="1" noEditPoints="1" noAdjustHandles="1" noChangeArrowheads="1" noChangeShapeType="1" noTextEdit="1"/>
+              </p:cNvSpPr>
+              <p:nvPr>
+                <p:ph idx="1"/>
+              </p:nvPr>
+            </p:nvSpPr>
+            <p:spPr>
+              <a:blipFill>
+                <a:blip r:embed="rId2"/>
+                <a:stretch>
+                  <a:fillRect l="-1521"/>
+                </a:stretch>
+              </a:blipFill>
+            </p:spPr>
+            <p:txBody>
+              <a:bodyPr/>
+              <a:lstStyle/>
+              <a:p>
+                <a:r>
+                  <a:rPr lang="en-US">
+                    <a:noFill/>
+                  </a:rPr>
+                  <a:t> </a:t>
+                </a:r>
+              </a:p>
+            </p:txBody>
+          </p:sp>
+        </mc:Fallback>
+      </mc:AlternateContent>
     </p:spTree>
     <p:extLst>
       <p:ext uri="{BB962C8B-B14F-4D97-AF65-F5344CB8AC3E}">
@@ -6649,7 +7172,7 @@
 </p:sld>
 </file>
 
-<file path=ppt/slides/slide7.xml><?xml version="1.0" encoding="utf-8"?>
+<file path=ppt/slides/slide9.xml><?xml version="1.0" encoding="utf-8"?>
 <p:sld xmlns:a="http://schemas.openxmlformats.org/drawingml/2006/main" xmlns:r="http://schemas.openxmlformats.org/officeDocument/2006/relationships" xmlns:p="http://schemas.openxmlformats.org/presentationml/2006/main">
   <p:cSld>
     <p:spTree>

</xml_diff>